<commit_message>
Update poster with reformatted text
</commit_message>
<xml_diff>
--- a/docs/vision/doc/פוסטר.pptx
+++ b/docs/vision/doc/פוסטר.pptx
@@ -106,7 +106,7 @@
   </p:defaultTextStyle>
   <p:extLst>
     <p:ext uri="{EFAFB233-063F-42B5-8137-9DF3F51BA10A}">
-      <p15:sldGuideLst xmlns:p15="http://schemas.microsoft.com/office/powerpoint/2012/main"/>
+      <p15:sldGuideLst xmlns:p15="http://schemas.microsoft.com/office/powerpoint/2012/main" xmlns=""/>
     </p:ext>
   </p:extLst>
 </p:presentation>
@@ -243,7 +243,8 @@
           <a:p>
             <a:fld id="{6DC17A7E-F9A2-4A27-9032-C5D480A99B8D}" type="datetimeFigureOut">
               <a:rPr lang="he-IL" smtClean="0"/>
-              <a:t>ז'/אייר/תשע"ח</a:t>
+              <a:pPr/>
+              <a:t>י"ב/אייר/תשע"ח</a:t>
             </a:fld>
             <a:endParaRPr lang="he-IL"/>
           </a:p>
@@ -285,6 +286,7 @@
           <a:p>
             <a:fld id="{E0959735-0C9E-41EB-8840-52CA8FDACAC3}" type="slidenum">
               <a:rPr lang="he-IL" smtClean="0"/>
+              <a:pPr/>
               <a:t>‹#›</a:t>
             </a:fld>
             <a:endParaRPr lang="he-IL"/>
@@ -294,7 +296,7 @@
     </p:spTree>
     <p:extLst>
       <p:ext uri="{BB962C8B-B14F-4D97-AF65-F5344CB8AC3E}">
-        <p14:creationId xmlns:p14="http://schemas.microsoft.com/office/powerpoint/2010/main" val="3502688473"/>
+        <p14:creationId xmlns:p14="http://schemas.microsoft.com/office/powerpoint/2010/main" xmlns="" val="3502688473"/>
       </p:ext>
     </p:extLst>
   </p:cSld>
@@ -413,7 +415,8 @@
           <a:p>
             <a:fld id="{6DC17A7E-F9A2-4A27-9032-C5D480A99B8D}" type="datetimeFigureOut">
               <a:rPr lang="he-IL" smtClean="0"/>
-              <a:t>ז'/אייר/תשע"ח</a:t>
+              <a:pPr/>
+              <a:t>י"ב/אייר/תשע"ח</a:t>
             </a:fld>
             <a:endParaRPr lang="he-IL"/>
           </a:p>
@@ -455,6 +458,7 @@
           <a:p>
             <a:fld id="{E0959735-0C9E-41EB-8840-52CA8FDACAC3}" type="slidenum">
               <a:rPr lang="he-IL" smtClean="0"/>
+              <a:pPr/>
               <a:t>‹#›</a:t>
             </a:fld>
             <a:endParaRPr lang="he-IL"/>
@@ -464,7 +468,7 @@
     </p:spTree>
     <p:extLst>
       <p:ext uri="{BB962C8B-B14F-4D97-AF65-F5344CB8AC3E}">
-        <p14:creationId xmlns:p14="http://schemas.microsoft.com/office/powerpoint/2010/main" val="2665807175"/>
+        <p14:creationId xmlns:p14="http://schemas.microsoft.com/office/powerpoint/2010/main" xmlns="" val="2665807175"/>
       </p:ext>
     </p:extLst>
   </p:cSld>
@@ -593,7 +597,8 @@
           <a:p>
             <a:fld id="{6DC17A7E-F9A2-4A27-9032-C5D480A99B8D}" type="datetimeFigureOut">
               <a:rPr lang="he-IL" smtClean="0"/>
-              <a:t>ז'/אייר/תשע"ח</a:t>
+              <a:pPr/>
+              <a:t>י"ב/אייר/תשע"ח</a:t>
             </a:fld>
             <a:endParaRPr lang="he-IL"/>
           </a:p>
@@ -635,6 +640,7 @@
           <a:p>
             <a:fld id="{E0959735-0C9E-41EB-8840-52CA8FDACAC3}" type="slidenum">
               <a:rPr lang="he-IL" smtClean="0"/>
+              <a:pPr/>
               <a:t>‹#›</a:t>
             </a:fld>
             <a:endParaRPr lang="he-IL"/>
@@ -644,7 +650,7 @@
     </p:spTree>
     <p:extLst>
       <p:ext uri="{BB962C8B-B14F-4D97-AF65-F5344CB8AC3E}">
-        <p14:creationId xmlns:p14="http://schemas.microsoft.com/office/powerpoint/2010/main" val="4029155612"/>
+        <p14:creationId xmlns:p14="http://schemas.microsoft.com/office/powerpoint/2010/main" xmlns="" val="4029155612"/>
       </p:ext>
     </p:extLst>
   </p:cSld>
@@ -763,7 +769,8 @@
           <a:p>
             <a:fld id="{6DC17A7E-F9A2-4A27-9032-C5D480A99B8D}" type="datetimeFigureOut">
               <a:rPr lang="he-IL" smtClean="0"/>
-              <a:t>ז'/אייר/תשע"ח</a:t>
+              <a:pPr/>
+              <a:t>י"ב/אייר/תשע"ח</a:t>
             </a:fld>
             <a:endParaRPr lang="he-IL"/>
           </a:p>
@@ -805,6 +812,7 @@
           <a:p>
             <a:fld id="{E0959735-0C9E-41EB-8840-52CA8FDACAC3}" type="slidenum">
               <a:rPr lang="he-IL" smtClean="0"/>
+              <a:pPr/>
               <a:t>‹#›</a:t>
             </a:fld>
             <a:endParaRPr lang="he-IL"/>
@@ -814,7 +822,7 @@
     </p:spTree>
     <p:extLst>
       <p:ext uri="{BB962C8B-B14F-4D97-AF65-F5344CB8AC3E}">
-        <p14:creationId xmlns:p14="http://schemas.microsoft.com/office/powerpoint/2010/main" val="2465494500"/>
+        <p14:creationId xmlns:p14="http://schemas.microsoft.com/office/powerpoint/2010/main" xmlns="" val="2465494500"/>
       </p:ext>
     </p:extLst>
   </p:cSld>
@@ -1007,7 +1015,8 @@
           <a:p>
             <a:fld id="{6DC17A7E-F9A2-4A27-9032-C5D480A99B8D}" type="datetimeFigureOut">
               <a:rPr lang="he-IL" smtClean="0"/>
-              <a:t>ז'/אייר/תשע"ח</a:t>
+              <a:pPr/>
+              <a:t>י"ב/אייר/תשע"ח</a:t>
             </a:fld>
             <a:endParaRPr lang="he-IL"/>
           </a:p>
@@ -1049,6 +1058,7 @@
           <a:p>
             <a:fld id="{E0959735-0C9E-41EB-8840-52CA8FDACAC3}" type="slidenum">
               <a:rPr lang="he-IL" smtClean="0"/>
+              <a:pPr/>
               <a:t>‹#›</a:t>
             </a:fld>
             <a:endParaRPr lang="he-IL"/>
@@ -1058,7 +1068,7 @@
     </p:spTree>
     <p:extLst>
       <p:ext uri="{BB962C8B-B14F-4D97-AF65-F5344CB8AC3E}">
-        <p14:creationId xmlns:p14="http://schemas.microsoft.com/office/powerpoint/2010/main" val="1449292553"/>
+        <p14:creationId xmlns:p14="http://schemas.microsoft.com/office/powerpoint/2010/main" xmlns="" val="1449292553"/>
       </p:ext>
     </p:extLst>
   </p:cSld>
@@ -1239,7 +1249,8 @@
           <a:p>
             <a:fld id="{6DC17A7E-F9A2-4A27-9032-C5D480A99B8D}" type="datetimeFigureOut">
               <a:rPr lang="he-IL" smtClean="0"/>
-              <a:t>ז'/אייר/תשע"ח</a:t>
+              <a:pPr/>
+              <a:t>י"ב/אייר/תשע"ח</a:t>
             </a:fld>
             <a:endParaRPr lang="he-IL"/>
           </a:p>
@@ -1281,6 +1292,7 @@
           <a:p>
             <a:fld id="{E0959735-0C9E-41EB-8840-52CA8FDACAC3}" type="slidenum">
               <a:rPr lang="he-IL" smtClean="0"/>
+              <a:pPr/>
               <a:t>‹#›</a:t>
             </a:fld>
             <a:endParaRPr lang="he-IL"/>
@@ -1290,7 +1302,7 @@
     </p:spTree>
     <p:extLst>
       <p:ext uri="{BB962C8B-B14F-4D97-AF65-F5344CB8AC3E}">
-        <p14:creationId xmlns:p14="http://schemas.microsoft.com/office/powerpoint/2010/main" val="1902148777"/>
+        <p14:creationId xmlns:p14="http://schemas.microsoft.com/office/powerpoint/2010/main" xmlns="" val="1902148777"/>
       </p:ext>
     </p:extLst>
   </p:cSld>
@@ -1606,7 +1618,8 @@
           <a:p>
             <a:fld id="{6DC17A7E-F9A2-4A27-9032-C5D480A99B8D}" type="datetimeFigureOut">
               <a:rPr lang="he-IL" smtClean="0"/>
-              <a:t>ז'/אייר/תשע"ח</a:t>
+              <a:pPr/>
+              <a:t>י"ב/אייר/תשע"ח</a:t>
             </a:fld>
             <a:endParaRPr lang="he-IL"/>
           </a:p>
@@ -1648,6 +1661,7 @@
           <a:p>
             <a:fld id="{E0959735-0C9E-41EB-8840-52CA8FDACAC3}" type="slidenum">
               <a:rPr lang="he-IL" smtClean="0"/>
+              <a:pPr/>
               <a:t>‹#›</a:t>
             </a:fld>
             <a:endParaRPr lang="he-IL"/>
@@ -1657,7 +1671,7 @@
     </p:spTree>
     <p:extLst>
       <p:ext uri="{BB962C8B-B14F-4D97-AF65-F5344CB8AC3E}">
-        <p14:creationId xmlns:p14="http://schemas.microsoft.com/office/powerpoint/2010/main" val="2336941052"/>
+        <p14:creationId xmlns:p14="http://schemas.microsoft.com/office/powerpoint/2010/main" xmlns="" val="2336941052"/>
       </p:ext>
     </p:extLst>
   </p:cSld>
@@ -1724,7 +1738,8 @@
           <a:p>
             <a:fld id="{6DC17A7E-F9A2-4A27-9032-C5D480A99B8D}" type="datetimeFigureOut">
               <a:rPr lang="he-IL" smtClean="0"/>
-              <a:t>ז'/אייר/תשע"ח</a:t>
+              <a:pPr/>
+              <a:t>י"ב/אייר/תשע"ח</a:t>
             </a:fld>
             <a:endParaRPr lang="he-IL"/>
           </a:p>
@@ -1766,6 +1781,7 @@
           <a:p>
             <a:fld id="{E0959735-0C9E-41EB-8840-52CA8FDACAC3}" type="slidenum">
               <a:rPr lang="he-IL" smtClean="0"/>
+              <a:pPr/>
               <a:t>‹#›</a:t>
             </a:fld>
             <a:endParaRPr lang="he-IL"/>
@@ -1775,7 +1791,7 @@
     </p:spTree>
     <p:extLst>
       <p:ext uri="{BB962C8B-B14F-4D97-AF65-F5344CB8AC3E}">
-        <p14:creationId xmlns:p14="http://schemas.microsoft.com/office/powerpoint/2010/main" val="3788453255"/>
+        <p14:creationId xmlns:p14="http://schemas.microsoft.com/office/powerpoint/2010/main" xmlns="" val="3788453255"/>
       </p:ext>
     </p:extLst>
   </p:cSld>
@@ -1819,7 +1835,8 @@
           <a:p>
             <a:fld id="{6DC17A7E-F9A2-4A27-9032-C5D480A99B8D}" type="datetimeFigureOut">
               <a:rPr lang="he-IL" smtClean="0"/>
-              <a:t>ז'/אייר/תשע"ח</a:t>
+              <a:pPr/>
+              <a:t>י"ב/אייר/תשע"ח</a:t>
             </a:fld>
             <a:endParaRPr lang="he-IL"/>
           </a:p>
@@ -1861,6 +1878,7 @@
           <a:p>
             <a:fld id="{E0959735-0C9E-41EB-8840-52CA8FDACAC3}" type="slidenum">
               <a:rPr lang="he-IL" smtClean="0"/>
+              <a:pPr/>
               <a:t>‹#›</a:t>
             </a:fld>
             <a:endParaRPr lang="he-IL"/>
@@ -1870,7 +1888,7 @@
     </p:spTree>
     <p:extLst>
       <p:ext uri="{BB962C8B-B14F-4D97-AF65-F5344CB8AC3E}">
-        <p14:creationId xmlns:p14="http://schemas.microsoft.com/office/powerpoint/2010/main" val="4284511924"/>
+        <p14:creationId xmlns:p14="http://schemas.microsoft.com/office/powerpoint/2010/main" xmlns="" val="4284511924"/>
       </p:ext>
     </p:extLst>
   </p:cSld>
@@ -2096,7 +2114,8 @@
           <a:p>
             <a:fld id="{6DC17A7E-F9A2-4A27-9032-C5D480A99B8D}" type="datetimeFigureOut">
               <a:rPr lang="he-IL" smtClean="0"/>
-              <a:t>ז'/אייר/תשע"ח</a:t>
+              <a:pPr/>
+              <a:t>י"ב/אייר/תשע"ח</a:t>
             </a:fld>
             <a:endParaRPr lang="he-IL"/>
           </a:p>
@@ -2138,6 +2157,7 @@
           <a:p>
             <a:fld id="{E0959735-0C9E-41EB-8840-52CA8FDACAC3}" type="slidenum">
               <a:rPr lang="he-IL" smtClean="0"/>
+              <a:pPr/>
               <a:t>‹#›</a:t>
             </a:fld>
             <a:endParaRPr lang="he-IL"/>
@@ -2147,7 +2167,7 @@
     </p:spTree>
     <p:extLst>
       <p:ext uri="{BB962C8B-B14F-4D97-AF65-F5344CB8AC3E}">
-        <p14:creationId xmlns:p14="http://schemas.microsoft.com/office/powerpoint/2010/main" val="1241910232"/>
+        <p14:creationId xmlns:p14="http://schemas.microsoft.com/office/powerpoint/2010/main" xmlns="" val="1241910232"/>
       </p:ext>
     </p:extLst>
   </p:cSld>
@@ -2353,7 +2373,8 @@
           <a:p>
             <a:fld id="{6DC17A7E-F9A2-4A27-9032-C5D480A99B8D}" type="datetimeFigureOut">
               <a:rPr lang="he-IL" smtClean="0"/>
-              <a:t>ז'/אייר/תשע"ח</a:t>
+              <a:pPr/>
+              <a:t>י"ב/אייר/תשע"ח</a:t>
             </a:fld>
             <a:endParaRPr lang="he-IL"/>
           </a:p>
@@ -2395,6 +2416,7 @@
           <a:p>
             <a:fld id="{E0959735-0C9E-41EB-8840-52CA8FDACAC3}" type="slidenum">
               <a:rPr lang="he-IL" smtClean="0"/>
+              <a:pPr/>
               <a:t>‹#›</a:t>
             </a:fld>
             <a:endParaRPr lang="he-IL"/>
@@ -2404,7 +2426,7 @@
     </p:spTree>
     <p:extLst>
       <p:ext uri="{BB962C8B-B14F-4D97-AF65-F5344CB8AC3E}">
-        <p14:creationId xmlns:p14="http://schemas.microsoft.com/office/powerpoint/2010/main" val="2412757116"/>
+        <p14:creationId xmlns:p14="http://schemas.microsoft.com/office/powerpoint/2010/main" xmlns="" val="2412757116"/>
       </p:ext>
     </p:extLst>
   </p:cSld>
@@ -2566,7 +2588,8 @@
           <a:p>
             <a:fld id="{6DC17A7E-F9A2-4A27-9032-C5D480A99B8D}" type="datetimeFigureOut">
               <a:rPr lang="he-IL" smtClean="0"/>
-              <a:t>ז'/אייר/תשע"ח</a:t>
+              <a:pPr/>
+              <a:t>י"ב/אייר/תשע"ח</a:t>
             </a:fld>
             <a:endParaRPr lang="he-IL"/>
           </a:p>
@@ -2644,6 +2667,7 @@
           <a:p>
             <a:fld id="{E0959735-0C9E-41EB-8840-52CA8FDACAC3}" type="slidenum">
               <a:rPr lang="he-IL" smtClean="0"/>
+              <a:pPr/>
               <a:t>‹#›</a:t>
             </a:fld>
             <a:endParaRPr lang="he-IL"/>
@@ -2653,7 +2677,7 @@
     </p:spTree>
     <p:extLst>
       <p:ext uri="{BB962C8B-B14F-4D97-AF65-F5344CB8AC3E}">
-        <p14:creationId xmlns:p14="http://schemas.microsoft.com/office/powerpoint/2010/main" val="467028902"/>
+        <p14:creationId xmlns:p14="http://schemas.microsoft.com/office/powerpoint/2010/main" xmlns="" val="467028902"/>
       </p:ext>
     </p:extLst>
   </p:cSld>
@@ -2980,7 +3004,7 @@
           <p:nvPr/>
         </p:nvPicPr>
         <p:blipFill>
-          <a:blip r:embed="rId2"/>
+          <a:blip r:embed="rId2" cstate="print"/>
           <a:stretch>
             <a:fillRect/>
           </a:stretch>
@@ -3070,7 +3094,7 @@
           </a:bodyPr>
           <a:lstStyle/>
           <a:p>
-            <a:pPr algn="r"/>
+            <a:pPr algn="r" rtl="1"/>
             <a:r>
               <a:rPr lang="he-IL" sz="2800" b="1" dirty="0" smtClean="0">
                 <a:latin typeface="Gisha" panose="020B0502040204020203" pitchFamily="34" charset="-79"/>
@@ -3087,7 +3111,7 @@
             </a:r>
           </a:p>
           <a:p>
-            <a:pPr algn="r"/>
+            <a:pPr algn="r" rtl="1"/>
             <a:r>
               <a:rPr lang="he-IL" sz="2800" b="1" dirty="0" smtClean="0">
                 <a:latin typeface="Gisha" panose="020B0502040204020203" pitchFamily="34" charset="-79"/>
@@ -3100,11 +3124,22 @@
                 <a:latin typeface="Gisha" panose="020B0502040204020203" pitchFamily="34" charset="-79"/>
                 <a:cs typeface="Gisha" panose="020B0502040204020203" pitchFamily="34" charset="-79"/>
               </a:rPr>
-              <a:t> רון שחר </a:t>
-            </a:r>
-          </a:p>
-          <a:p>
-            <a:pPr algn="r"/>
+              <a:t> </a:t>
+            </a:r>
+            <a:r>
+              <a:rPr lang="he-IL" sz="2800" dirty="0" smtClean="0">
+                <a:latin typeface="Gisha" panose="020B0502040204020203" pitchFamily="34" charset="-79"/>
+                <a:cs typeface="Gisha" panose="020B0502040204020203" pitchFamily="34" charset="-79"/>
+              </a:rPr>
+              <a:t>משה שחר </a:t>
+            </a:r>
+            <a:endParaRPr lang="he-IL" sz="2800" dirty="0" smtClean="0">
+              <a:latin typeface="Gisha" panose="020B0502040204020203" pitchFamily="34" charset="-79"/>
+              <a:cs typeface="Gisha" panose="020B0502040204020203" pitchFamily="34" charset="-79"/>
+            </a:endParaRPr>
+          </a:p>
+          <a:p>
+            <a:pPr algn="r" rtl="1"/>
             <a:r>
               <a:rPr lang="he-IL" sz="2800" b="1" dirty="0" smtClean="0">
                 <a:latin typeface="Gisha" panose="020B0502040204020203" pitchFamily="34" charset="-79"/>
@@ -3135,7 +3170,7 @@
         <p:spPr>
           <a:xfrm>
             <a:off x="842211" y="5197642"/>
-            <a:ext cx="7916778" cy="954107"/>
+            <a:ext cx="7916778" cy="1384995"/>
           </a:xfrm>
           <a:prstGeom prst="rect">
             <a:avLst/>
@@ -3148,7 +3183,7 @@
           </a:bodyPr>
           <a:lstStyle/>
           <a:p>
-            <a:pPr algn="r"/>
+            <a:pPr algn="just" rtl="1"/>
             <a:r>
               <a:rPr lang="he-IL" sz="2800" b="1" dirty="0" smtClean="0">
                 <a:latin typeface="Gisha" panose="020B0502040204020203" pitchFamily="34" charset="-79"/>
@@ -3161,8 +3196,40 @@
                 <a:latin typeface="Gisha" panose="020B0502040204020203" pitchFamily="34" charset="-79"/>
                 <a:cs typeface="Gisha" panose="020B0502040204020203" pitchFamily="34" charset="-79"/>
               </a:rPr>
-              <a:t> פרויקט מערכת לומדת הלומדת לזהות את העצם המופיע בתמונה.</a:t>
-            </a:r>
+              <a:t> </a:t>
+            </a:r>
+            <a:r>
+              <a:rPr lang="en-US" sz="2800" dirty="0" err="1" smtClean="0">
+                <a:latin typeface="Gisha" panose="020B0502040204020203" pitchFamily="34" charset="-79"/>
+                <a:cs typeface="Gisha" panose="020B0502040204020203" pitchFamily="34" charset="-79"/>
+              </a:rPr>
+              <a:t>xAI</a:t>
+            </a:r>
+            <a:r>
+              <a:rPr lang="he-IL" sz="2800" dirty="0" smtClean="0">
+                <a:latin typeface="Gisha" panose="020B0502040204020203" pitchFamily="34" charset="-79"/>
+                <a:cs typeface="Gisha" panose="020B0502040204020203" pitchFamily="34" charset="-79"/>
+              </a:rPr>
+              <a:t> היא פלטפורמה למפתחים ליצירת רשתות־נוירונים לומדות ולהפעלתן בצורה פשוטה באמצעות ממשק </a:t>
+            </a:r>
+            <a:r>
+              <a:rPr lang="en-US" sz="2800" dirty="0" smtClean="0">
+                <a:latin typeface="Gisha" panose="020B0502040204020203" pitchFamily="34" charset="-79"/>
+                <a:cs typeface="Gisha" panose="020B0502040204020203" pitchFamily="34" charset="-79"/>
+              </a:rPr>
+              <a:t>Restful API</a:t>
+            </a:r>
+            <a:r>
+              <a:rPr lang="he-IL" sz="2800" dirty="0" smtClean="0">
+                <a:latin typeface="Gisha" panose="020B0502040204020203" pitchFamily="34" charset="-79"/>
+                <a:cs typeface="Gisha" panose="020B0502040204020203" pitchFamily="34" charset="-79"/>
+              </a:rPr>
+              <a:t>.</a:t>
+            </a:r>
+            <a:endParaRPr lang="he-IL" sz="2800" dirty="0" smtClean="0">
+              <a:latin typeface="Gisha" panose="020B0502040204020203" pitchFamily="34" charset="-79"/>
+              <a:cs typeface="Gisha" panose="020B0502040204020203" pitchFamily="34" charset="-79"/>
+            </a:endParaRPr>
           </a:p>
         </p:txBody>
       </p:sp>
@@ -3174,8 +3241,8 @@
         </p:nvSpPr>
         <p:spPr>
           <a:xfrm>
-            <a:off x="5029200" y="7531768"/>
-            <a:ext cx="3729789" cy="3416320"/>
+            <a:off x="5029200" y="7452938"/>
+            <a:ext cx="3729789" cy="4154984"/>
           </a:xfrm>
           <a:prstGeom prst="rect">
             <a:avLst/>
@@ -3188,42 +3255,114 @@
           </a:bodyPr>
           <a:lstStyle/>
           <a:p>
-            <a:pPr algn="r"/>
+            <a:pPr algn="just" rtl="1"/>
             <a:r>
               <a:rPr lang="he-IL" sz="2400" b="1" dirty="0" smtClean="0">
-                <a:latin typeface="gisha (גוף)"/>
+                <a:latin typeface="Gisha" pitchFamily="34" charset="-79"/>
+                <a:cs typeface="Gisha" pitchFamily="34" charset="-79"/>
               </a:rPr>
               <a:t>פיצ'רים עיקריים:</a:t>
             </a:r>
           </a:p>
           <a:p>
-            <a:pPr algn="r"/>
+            <a:pPr marL="457200" indent="-457200" algn="just" rtl="1">
+              <a:buAutoNum type="arabicPeriod"/>
+            </a:pPr>
             <a:r>
               <a:rPr lang="he-IL" sz="2400" dirty="0" smtClean="0">
-                <a:latin typeface="gisha (גוף)"/>
+                <a:latin typeface="Gisha" pitchFamily="34" charset="-79"/>
+                <a:cs typeface="Gisha" pitchFamily="34" charset="-79"/>
               </a:rPr>
-              <a:t>1. רשת נוירונים הלומדת לזהות תמונות.</a:t>
-            </a:r>
-          </a:p>
-          <a:p>
-            <a:pPr algn="r"/>
+              <a:t>יצירה של רשתות </a:t>
+            </a:r>
             <a:r>
               <a:rPr lang="he-IL" sz="2400" dirty="0" smtClean="0">
-                <a:latin typeface="gisha (גוף)"/>
+                <a:latin typeface="Gisha" pitchFamily="34" charset="-79"/>
+                <a:cs typeface="Gisha" pitchFamily="34" charset="-79"/>
               </a:rPr>
-              <a:t>2. שרת המאפשר ניהול חשבונות וגישה לרשת הנוירונים.</a:t>
-            </a:r>
-          </a:p>
-          <a:p>
-            <a:pPr algn="r"/>
+              <a:t>נוירונים הלומדת לזהות תמונות</a:t>
+            </a:r>
             <a:r>
               <a:rPr lang="he-IL" sz="2400" dirty="0" smtClean="0">
-                <a:latin typeface="gisha (גוף)"/>
+                <a:latin typeface="Gisha" pitchFamily="34" charset="-79"/>
+                <a:cs typeface="Gisha" pitchFamily="34" charset="-79"/>
               </a:rPr>
-              <a:t>3. ממשק משתמש בדמות אתר אינטרנט המאפשר אימון ובדיקה של רשת הנוירונים.</a:t>
+              <a:t>.</a:t>
+            </a:r>
+          </a:p>
+          <a:p>
+            <a:pPr marL="457200" indent="-457200" algn="just" rtl="1">
+              <a:buAutoNum type="arabicPeriod"/>
+            </a:pPr>
+            <a:endParaRPr lang="he-IL" sz="2400" dirty="0" smtClean="0">
+              <a:latin typeface="Gisha" pitchFamily="34" charset="-79"/>
+              <a:cs typeface="Gisha" pitchFamily="34" charset="-79"/>
+            </a:endParaRPr>
+          </a:p>
+          <a:p>
+            <a:pPr algn="just" rtl="1"/>
+            <a:r>
+              <a:rPr lang="he-IL" sz="2400" dirty="0" smtClean="0">
+                <a:latin typeface="Gisha" pitchFamily="34" charset="-79"/>
+                <a:cs typeface="Gisha" pitchFamily="34" charset="-79"/>
+              </a:rPr>
+              <a:t>2. </a:t>
+            </a:r>
+            <a:r>
+              <a:rPr lang="he-IL" sz="2400" dirty="0" smtClean="0">
+                <a:latin typeface="Gisha" pitchFamily="34" charset="-79"/>
+                <a:cs typeface="Gisha" pitchFamily="34" charset="-79"/>
+              </a:rPr>
+              <a:t>אתר המאפשר עבודה פשוטה עם מאגרי מידע גדולים ועם רשתות לומדות, המאפשר </a:t>
+            </a:r>
+            <a:r>
+              <a:rPr lang="he-IL" sz="2400" dirty="0" smtClean="0">
+                <a:latin typeface="Gisha" pitchFamily="34" charset="-79"/>
+                <a:cs typeface="Gisha" pitchFamily="34" charset="-79"/>
+              </a:rPr>
+              <a:t>אימון ובדיקה </a:t>
+            </a:r>
+            <a:r>
+              <a:rPr lang="he-IL" sz="2400" dirty="0" smtClean="0">
+                <a:latin typeface="Gisha" pitchFamily="34" charset="-79"/>
+                <a:cs typeface="Gisha" pitchFamily="34" charset="-79"/>
+              </a:rPr>
+              <a:t>שלהן.</a:t>
+            </a:r>
+          </a:p>
+          <a:p>
+            <a:pPr algn="just" rtl="1"/>
+            <a:endParaRPr lang="he-IL" sz="2400" dirty="0" smtClean="0">
+              <a:latin typeface="Gisha" pitchFamily="34" charset="-79"/>
+              <a:cs typeface="Gisha" pitchFamily="34" charset="-79"/>
+            </a:endParaRPr>
+          </a:p>
+          <a:p>
+            <a:pPr algn="just" rtl="1"/>
+            <a:r>
+              <a:rPr lang="he-IL" sz="2400" dirty="0" smtClean="0">
+                <a:latin typeface="Gisha" pitchFamily="34" charset="-79"/>
+                <a:cs typeface="Gisha" pitchFamily="34" charset="-79"/>
+              </a:rPr>
+              <a:t>3. ממשק </a:t>
+            </a:r>
+            <a:r>
+              <a:rPr lang="en-US" sz="2400" dirty="0" smtClean="0">
+                <a:latin typeface="Gisha" pitchFamily="34" charset="-79"/>
+                <a:cs typeface="Gisha" pitchFamily="34" charset="-79"/>
+              </a:rPr>
+              <a:t>API</a:t>
+            </a:r>
+            <a:r>
+              <a:rPr lang="he-IL" sz="2400" dirty="0" smtClean="0">
+                <a:latin typeface="Gisha" pitchFamily="34" charset="-79"/>
+                <a:cs typeface="Gisha" pitchFamily="34" charset="-79"/>
+              </a:rPr>
+              <a:t> פשוט לשימוש ברשתות הנוירונים.</a:t>
             </a:r>
             <a:endParaRPr lang="en-US" sz="2400" dirty="0" smtClean="0">
-              <a:latin typeface="gisha (גוף)"/>
+              <a:latin typeface="Gisha" pitchFamily="34" charset="-79"/>
+              <a:cs typeface="Gisha" pitchFamily="34" charset="-79"/>
             </a:endParaRPr>
           </a:p>
         </p:txBody>
@@ -3240,7 +3379,7 @@
           <a:blip r:embed="rId3" cstate="print">
             <a:extLst>
               <a:ext uri="{28A0092B-C50C-407E-A947-70E740481C1C}">
-                <a14:useLocalDpi xmlns:a14="http://schemas.microsoft.com/office/drawing/2010/main" val="0"/>
+                <a14:useLocalDpi xmlns:a14="http://schemas.microsoft.com/office/drawing/2010/main" xmlns="" val="0"/>
               </a:ext>
             </a:extLst>
           </a:blip>
@@ -3261,7 +3400,7 @@
     </p:spTree>
     <p:extLst>
       <p:ext uri="{BB962C8B-B14F-4D97-AF65-F5344CB8AC3E}">
-        <p14:creationId xmlns:p14="http://schemas.microsoft.com/office/powerpoint/2010/main" val="1035157805"/>
+        <p14:creationId xmlns:p14="http://schemas.microsoft.com/office/powerpoint/2010/main" xmlns="" val="1035157805"/>
       </p:ext>
     </p:extLst>
   </p:cSld>
@@ -3314,7 +3453,7 @@
     </a:clrScheme>
     <a:fontScheme name="ערכת נושא Office">
       <a:majorFont>
-        <a:latin typeface="Calibri Light" panose="020F0302020204030204"/>
+        <a:latin typeface="Calibri Light"/>
         <a:ea typeface=""/>
         <a:cs typeface=""/>
         <a:font script="Jpan" typeface="游ゴシック Light"/>
@@ -3349,7 +3488,7 @@
         <a:font script="Geor" typeface="Sylfaen"/>
       </a:majorFont>
       <a:minorFont>
-        <a:latin typeface="Calibri" panose="020F0502020204030204"/>
+        <a:latin typeface="Calibri"/>
         <a:ea typeface=""/>
         <a:cs typeface=""/>
         <a:font script="Jpan" typeface="游ゴシック"/>
@@ -3526,7 +3665,7 @@
   <a:extraClrSchemeLst/>
   <a:extLst>
     <a:ext uri="{05A4C25C-085E-4340-85A3-A5531E510DB2}">
-      <thm15:themeFamily xmlns:thm15="http://schemas.microsoft.com/office/thememl/2012/main" name="Office Theme" id="{62F939B6-93AF-4DB8-9C6B-D6C7DFDC589F}" vid="{4A3C46E8-61CC-4603-A589-7422A47A8E4A}"/>
+      <thm15:themeFamily xmlns:thm15="http://schemas.microsoft.com/office/thememl/2012/main" xmlns="" name="Office Theme" id="{62F939B6-93AF-4DB8-9C6B-D6C7DFDC589F}" vid="{4A3C46E8-61CC-4603-A589-7422A47A8E4A}"/>
     </a:ext>
   </a:extLst>
 </a:theme>

</xml_diff>

<commit_message>
Update image in poster
</commit_message>
<xml_diff>
--- a/docs/vision/doc/פוסטר.pptx
+++ b/docs/vision/doc/פוסטר.pptx
@@ -106,7 +106,18 @@
   </p:defaultTextStyle>
   <p:extLst>
     <p:ext uri="{EFAFB233-063F-42B5-8137-9DF3F51BA10A}">
-      <p15:sldGuideLst xmlns:p15="http://schemas.microsoft.com/office/powerpoint/2012/main" xmlns=""/>
+      <p15:sldGuideLst xmlns:p15="http://schemas.microsoft.com/office/powerpoint/2012/main">
+        <p15:guide id="1" orient="horz" pos="4032">
+          <p15:clr>
+            <a:srgbClr val="A4A3A4"/>
+          </p15:clr>
+        </p15:guide>
+        <p15:guide id="2" pos="3024">
+          <p15:clr>
+            <a:srgbClr val="A4A3A4"/>
+          </p15:clr>
+        </p15:guide>
+      </p15:sldGuideLst>
     </p:ext>
   </p:extLst>
 </p:presentation>
@@ -244,7 +255,7 @@
             <a:fld id="{6DC17A7E-F9A2-4A27-9032-C5D480A99B8D}" type="datetimeFigureOut">
               <a:rPr lang="he-IL" smtClean="0"/>
               <a:pPr/>
-              <a:t>י"ב/אייר/תשע"ח</a:t>
+              <a:t>כ'/אייר/תשע"ח</a:t>
             </a:fld>
             <a:endParaRPr lang="he-IL"/>
           </a:p>
@@ -296,7 +307,7 @@
     </p:spTree>
     <p:extLst>
       <p:ext uri="{BB962C8B-B14F-4D97-AF65-F5344CB8AC3E}">
-        <p14:creationId xmlns:p14="http://schemas.microsoft.com/office/powerpoint/2010/main" xmlns="" val="3502688473"/>
+        <p14:creationId xmlns:p14="http://schemas.microsoft.com/office/powerpoint/2010/main" val="3502688473"/>
       </p:ext>
     </p:extLst>
   </p:cSld>
@@ -416,7 +427,7 @@
             <a:fld id="{6DC17A7E-F9A2-4A27-9032-C5D480A99B8D}" type="datetimeFigureOut">
               <a:rPr lang="he-IL" smtClean="0"/>
               <a:pPr/>
-              <a:t>י"ב/אייר/תשע"ח</a:t>
+              <a:t>כ'/אייר/תשע"ח</a:t>
             </a:fld>
             <a:endParaRPr lang="he-IL"/>
           </a:p>
@@ -468,7 +479,7 @@
     </p:spTree>
     <p:extLst>
       <p:ext uri="{BB962C8B-B14F-4D97-AF65-F5344CB8AC3E}">
-        <p14:creationId xmlns:p14="http://schemas.microsoft.com/office/powerpoint/2010/main" xmlns="" val="2665807175"/>
+        <p14:creationId xmlns:p14="http://schemas.microsoft.com/office/powerpoint/2010/main" val="2665807175"/>
       </p:ext>
     </p:extLst>
   </p:cSld>
@@ -598,7 +609,7 @@
             <a:fld id="{6DC17A7E-F9A2-4A27-9032-C5D480A99B8D}" type="datetimeFigureOut">
               <a:rPr lang="he-IL" smtClean="0"/>
               <a:pPr/>
-              <a:t>י"ב/אייר/תשע"ח</a:t>
+              <a:t>כ'/אייר/תשע"ח</a:t>
             </a:fld>
             <a:endParaRPr lang="he-IL"/>
           </a:p>
@@ -650,7 +661,7 @@
     </p:spTree>
     <p:extLst>
       <p:ext uri="{BB962C8B-B14F-4D97-AF65-F5344CB8AC3E}">
-        <p14:creationId xmlns:p14="http://schemas.microsoft.com/office/powerpoint/2010/main" xmlns="" val="4029155612"/>
+        <p14:creationId xmlns:p14="http://schemas.microsoft.com/office/powerpoint/2010/main" val="4029155612"/>
       </p:ext>
     </p:extLst>
   </p:cSld>
@@ -770,7 +781,7 @@
             <a:fld id="{6DC17A7E-F9A2-4A27-9032-C5D480A99B8D}" type="datetimeFigureOut">
               <a:rPr lang="he-IL" smtClean="0"/>
               <a:pPr/>
-              <a:t>י"ב/אייר/תשע"ח</a:t>
+              <a:t>כ'/אייר/תשע"ח</a:t>
             </a:fld>
             <a:endParaRPr lang="he-IL"/>
           </a:p>
@@ -822,7 +833,7 @@
     </p:spTree>
     <p:extLst>
       <p:ext uri="{BB962C8B-B14F-4D97-AF65-F5344CB8AC3E}">
-        <p14:creationId xmlns:p14="http://schemas.microsoft.com/office/powerpoint/2010/main" xmlns="" val="2465494500"/>
+        <p14:creationId xmlns:p14="http://schemas.microsoft.com/office/powerpoint/2010/main" val="2465494500"/>
       </p:ext>
     </p:extLst>
   </p:cSld>
@@ -1016,7 +1027,7 @@
             <a:fld id="{6DC17A7E-F9A2-4A27-9032-C5D480A99B8D}" type="datetimeFigureOut">
               <a:rPr lang="he-IL" smtClean="0"/>
               <a:pPr/>
-              <a:t>י"ב/אייר/תשע"ח</a:t>
+              <a:t>כ'/אייר/תשע"ח</a:t>
             </a:fld>
             <a:endParaRPr lang="he-IL"/>
           </a:p>
@@ -1068,7 +1079,7 @@
     </p:spTree>
     <p:extLst>
       <p:ext uri="{BB962C8B-B14F-4D97-AF65-F5344CB8AC3E}">
-        <p14:creationId xmlns:p14="http://schemas.microsoft.com/office/powerpoint/2010/main" xmlns="" val="1449292553"/>
+        <p14:creationId xmlns:p14="http://schemas.microsoft.com/office/powerpoint/2010/main" val="1449292553"/>
       </p:ext>
     </p:extLst>
   </p:cSld>
@@ -1250,7 +1261,7 @@
             <a:fld id="{6DC17A7E-F9A2-4A27-9032-C5D480A99B8D}" type="datetimeFigureOut">
               <a:rPr lang="he-IL" smtClean="0"/>
               <a:pPr/>
-              <a:t>י"ב/אייר/תשע"ח</a:t>
+              <a:t>כ'/אייר/תשע"ח</a:t>
             </a:fld>
             <a:endParaRPr lang="he-IL"/>
           </a:p>
@@ -1302,7 +1313,7 @@
     </p:spTree>
     <p:extLst>
       <p:ext uri="{BB962C8B-B14F-4D97-AF65-F5344CB8AC3E}">
-        <p14:creationId xmlns:p14="http://schemas.microsoft.com/office/powerpoint/2010/main" xmlns="" val="1902148777"/>
+        <p14:creationId xmlns:p14="http://schemas.microsoft.com/office/powerpoint/2010/main" val="1902148777"/>
       </p:ext>
     </p:extLst>
   </p:cSld>
@@ -1619,7 +1630,7 @@
             <a:fld id="{6DC17A7E-F9A2-4A27-9032-C5D480A99B8D}" type="datetimeFigureOut">
               <a:rPr lang="he-IL" smtClean="0"/>
               <a:pPr/>
-              <a:t>י"ב/אייר/תשע"ח</a:t>
+              <a:t>כ'/אייר/תשע"ח</a:t>
             </a:fld>
             <a:endParaRPr lang="he-IL"/>
           </a:p>
@@ -1671,7 +1682,7 @@
     </p:spTree>
     <p:extLst>
       <p:ext uri="{BB962C8B-B14F-4D97-AF65-F5344CB8AC3E}">
-        <p14:creationId xmlns:p14="http://schemas.microsoft.com/office/powerpoint/2010/main" xmlns="" val="2336941052"/>
+        <p14:creationId xmlns:p14="http://schemas.microsoft.com/office/powerpoint/2010/main" val="2336941052"/>
       </p:ext>
     </p:extLst>
   </p:cSld>
@@ -1739,7 +1750,7 @@
             <a:fld id="{6DC17A7E-F9A2-4A27-9032-C5D480A99B8D}" type="datetimeFigureOut">
               <a:rPr lang="he-IL" smtClean="0"/>
               <a:pPr/>
-              <a:t>י"ב/אייר/תשע"ח</a:t>
+              <a:t>כ'/אייר/תשע"ח</a:t>
             </a:fld>
             <a:endParaRPr lang="he-IL"/>
           </a:p>
@@ -1791,7 +1802,7 @@
     </p:spTree>
     <p:extLst>
       <p:ext uri="{BB962C8B-B14F-4D97-AF65-F5344CB8AC3E}">
-        <p14:creationId xmlns:p14="http://schemas.microsoft.com/office/powerpoint/2010/main" xmlns="" val="3788453255"/>
+        <p14:creationId xmlns:p14="http://schemas.microsoft.com/office/powerpoint/2010/main" val="3788453255"/>
       </p:ext>
     </p:extLst>
   </p:cSld>
@@ -1836,7 +1847,7 @@
             <a:fld id="{6DC17A7E-F9A2-4A27-9032-C5D480A99B8D}" type="datetimeFigureOut">
               <a:rPr lang="he-IL" smtClean="0"/>
               <a:pPr/>
-              <a:t>י"ב/אייר/תשע"ח</a:t>
+              <a:t>כ'/אייר/תשע"ח</a:t>
             </a:fld>
             <a:endParaRPr lang="he-IL"/>
           </a:p>
@@ -1888,7 +1899,7 @@
     </p:spTree>
     <p:extLst>
       <p:ext uri="{BB962C8B-B14F-4D97-AF65-F5344CB8AC3E}">
-        <p14:creationId xmlns:p14="http://schemas.microsoft.com/office/powerpoint/2010/main" xmlns="" val="4284511924"/>
+        <p14:creationId xmlns:p14="http://schemas.microsoft.com/office/powerpoint/2010/main" val="4284511924"/>
       </p:ext>
     </p:extLst>
   </p:cSld>
@@ -2115,7 +2126,7 @@
             <a:fld id="{6DC17A7E-F9A2-4A27-9032-C5D480A99B8D}" type="datetimeFigureOut">
               <a:rPr lang="he-IL" smtClean="0"/>
               <a:pPr/>
-              <a:t>י"ב/אייר/תשע"ח</a:t>
+              <a:t>כ'/אייר/תשע"ח</a:t>
             </a:fld>
             <a:endParaRPr lang="he-IL"/>
           </a:p>
@@ -2167,7 +2178,7 @@
     </p:spTree>
     <p:extLst>
       <p:ext uri="{BB962C8B-B14F-4D97-AF65-F5344CB8AC3E}">
-        <p14:creationId xmlns:p14="http://schemas.microsoft.com/office/powerpoint/2010/main" xmlns="" val="1241910232"/>
+        <p14:creationId xmlns:p14="http://schemas.microsoft.com/office/powerpoint/2010/main" val="1241910232"/>
       </p:ext>
     </p:extLst>
   </p:cSld>
@@ -2374,7 +2385,7 @@
             <a:fld id="{6DC17A7E-F9A2-4A27-9032-C5D480A99B8D}" type="datetimeFigureOut">
               <a:rPr lang="he-IL" smtClean="0"/>
               <a:pPr/>
-              <a:t>י"ב/אייר/תשע"ח</a:t>
+              <a:t>כ'/אייר/תשע"ח</a:t>
             </a:fld>
             <a:endParaRPr lang="he-IL"/>
           </a:p>
@@ -2426,7 +2437,7 @@
     </p:spTree>
     <p:extLst>
       <p:ext uri="{BB962C8B-B14F-4D97-AF65-F5344CB8AC3E}">
-        <p14:creationId xmlns:p14="http://schemas.microsoft.com/office/powerpoint/2010/main" xmlns="" val="2412757116"/>
+        <p14:creationId xmlns:p14="http://schemas.microsoft.com/office/powerpoint/2010/main" val="2412757116"/>
       </p:ext>
     </p:extLst>
   </p:cSld>
@@ -2589,7 +2600,7 @@
             <a:fld id="{6DC17A7E-F9A2-4A27-9032-C5D480A99B8D}" type="datetimeFigureOut">
               <a:rPr lang="he-IL" smtClean="0"/>
               <a:pPr/>
-              <a:t>י"ב/אייר/תשע"ח</a:t>
+              <a:t>כ'/אייר/תשע"ח</a:t>
             </a:fld>
             <a:endParaRPr lang="he-IL"/>
           </a:p>
@@ -2677,7 +2688,7 @@
     </p:spTree>
     <p:extLst>
       <p:ext uri="{BB962C8B-B14F-4D97-AF65-F5344CB8AC3E}">
-        <p14:creationId xmlns:p14="http://schemas.microsoft.com/office/powerpoint/2010/main" xmlns="" val="467028902"/>
+        <p14:creationId xmlns:p14="http://schemas.microsoft.com/office/powerpoint/2010/main" val="467028902"/>
       </p:ext>
     </p:extLst>
   </p:cSld>
@@ -3124,19 +3135,8 @@
                 <a:latin typeface="Gisha" panose="020B0502040204020203" pitchFamily="34" charset="-79"/>
                 <a:cs typeface="Gisha" panose="020B0502040204020203" pitchFamily="34" charset="-79"/>
               </a:rPr>
-              <a:t> </a:t>
-            </a:r>
-            <a:r>
-              <a:rPr lang="he-IL" sz="2800" dirty="0" smtClean="0">
-                <a:latin typeface="Gisha" panose="020B0502040204020203" pitchFamily="34" charset="-79"/>
-                <a:cs typeface="Gisha" panose="020B0502040204020203" pitchFamily="34" charset="-79"/>
-              </a:rPr>
-              <a:t>משה שחר </a:t>
-            </a:r>
-            <a:endParaRPr lang="he-IL" sz="2800" dirty="0" smtClean="0">
-              <a:latin typeface="Gisha" panose="020B0502040204020203" pitchFamily="34" charset="-79"/>
-              <a:cs typeface="Gisha" panose="020B0502040204020203" pitchFamily="34" charset="-79"/>
-            </a:endParaRPr>
+              <a:t> משה שחר </a:t>
+            </a:r>
           </a:p>
           <a:p>
             <a:pPr algn="r" rtl="1"/>
@@ -3226,10 +3226,6 @@
               </a:rPr>
               <a:t>.</a:t>
             </a:r>
-            <a:endParaRPr lang="he-IL" sz="2800" dirty="0" smtClean="0">
-              <a:latin typeface="Gisha" panose="020B0502040204020203" pitchFamily="34" charset="-79"/>
-              <a:cs typeface="Gisha" panose="020B0502040204020203" pitchFamily="34" charset="-79"/>
-            </a:endParaRPr>
           </a:p>
         </p:txBody>
       </p:sp>
@@ -3273,21 +3269,7 @@
                 <a:latin typeface="Gisha" pitchFamily="34" charset="-79"/>
                 <a:cs typeface="Gisha" pitchFamily="34" charset="-79"/>
               </a:rPr>
-              <a:t>יצירה של רשתות </a:t>
-            </a:r>
-            <a:r>
-              <a:rPr lang="he-IL" sz="2400" dirty="0" smtClean="0">
-                <a:latin typeface="Gisha" pitchFamily="34" charset="-79"/>
-                <a:cs typeface="Gisha" pitchFamily="34" charset="-79"/>
-              </a:rPr>
-              <a:t>נוירונים הלומדת לזהות תמונות</a:t>
-            </a:r>
-            <a:r>
-              <a:rPr lang="he-IL" sz="2400" dirty="0" smtClean="0">
-                <a:latin typeface="Gisha" pitchFamily="34" charset="-79"/>
-                <a:cs typeface="Gisha" pitchFamily="34" charset="-79"/>
-              </a:rPr>
-              <a:t>.</a:t>
+              <a:t>יצירה של רשתות נוירונים הלומדת לזהות תמונות.</a:t>
             </a:r>
           </a:p>
           <a:p>
@@ -3306,28 +3288,7 @@
                 <a:latin typeface="Gisha" pitchFamily="34" charset="-79"/>
                 <a:cs typeface="Gisha" pitchFamily="34" charset="-79"/>
               </a:rPr>
-              <a:t>2. </a:t>
-            </a:r>
-            <a:r>
-              <a:rPr lang="he-IL" sz="2400" dirty="0" smtClean="0">
-                <a:latin typeface="Gisha" pitchFamily="34" charset="-79"/>
-                <a:cs typeface="Gisha" pitchFamily="34" charset="-79"/>
-              </a:rPr>
-              <a:t>אתר המאפשר עבודה פשוטה עם מאגרי מידע גדולים ועם רשתות לומדות, המאפשר </a:t>
-            </a:r>
-            <a:r>
-              <a:rPr lang="he-IL" sz="2400" dirty="0" smtClean="0">
-                <a:latin typeface="Gisha" pitchFamily="34" charset="-79"/>
-                <a:cs typeface="Gisha" pitchFamily="34" charset="-79"/>
-              </a:rPr>
-              <a:t>אימון ובדיקה </a:t>
-            </a:r>
-            <a:r>
-              <a:rPr lang="he-IL" sz="2400" dirty="0" smtClean="0">
-                <a:latin typeface="Gisha" pitchFamily="34" charset="-79"/>
-                <a:cs typeface="Gisha" pitchFamily="34" charset="-79"/>
-              </a:rPr>
-              <a:t>שלהן.</a:t>
+              <a:t>2. אתר המאפשר עבודה פשוטה עם מאגרי מידע גדולים ועם רשתות לומדות, המאפשר אימון ובדיקה שלהן.</a:t>
             </a:r>
           </a:p>
           <a:p>
@@ -3369,28 +3330,22 @@
       </p:sp>
       <p:pic>
         <p:nvPicPr>
-          <p:cNvPr id="9" name="תמונה 8"/>
+          <p:cNvPr id="3" name="Picture 2"/>
           <p:cNvPicPr>
             <a:picLocks noChangeAspect="1"/>
           </p:cNvPicPr>
           <p:nvPr/>
         </p:nvPicPr>
         <p:blipFill>
-          <a:blip r:embed="rId3" cstate="print">
-            <a:extLst>
-              <a:ext uri="{28A0092B-C50C-407E-A947-70E740481C1C}">
-                <a14:useLocalDpi xmlns:a14="http://schemas.microsoft.com/office/drawing/2010/main" xmlns="" val="0"/>
-              </a:ext>
-            </a:extLst>
-          </a:blip>
+          <a:blip r:embed="rId3"/>
           <a:stretch>
             <a:fillRect/>
           </a:stretch>
         </p:blipFill>
         <p:spPr>
           <a:xfrm>
-            <a:off x="842211" y="7531769"/>
-            <a:ext cx="3958389" cy="3946358"/>
+            <a:off x="842211" y="7508812"/>
+            <a:ext cx="3929251" cy="3956357"/>
           </a:xfrm>
           <a:prstGeom prst="rect">
             <a:avLst/>
@@ -3400,7 +3355,7 @@
     </p:spTree>
     <p:extLst>
       <p:ext uri="{BB962C8B-B14F-4D97-AF65-F5344CB8AC3E}">
-        <p14:creationId xmlns:p14="http://schemas.microsoft.com/office/powerpoint/2010/main" xmlns="" val="1035157805"/>
+        <p14:creationId xmlns:p14="http://schemas.microsoft.com/office/powerpoint/2010/main" val="1035157805"/>
       </p:ext>
     </p:extLst>
   </p:cSld>
@@ -3665,7 +3620,7 @@
   <a:extraClrSchemeLst/>
   <a:extLst>
     <a:ext uri="{05A4C25C-085E-4340-85A3-A5531E510DB2}">
-      <thm15:themeFamily xmlns:thm15="http://schemas.microsoft.com/office/thememl/2012/main" xmlns="" name="Office Theme" id="{62F939B6-93AF-4DB8-9C6B-D6C7DFDC589F}" vid="{4A3C46E8-61CC-4603-A589-7422A47A8E4A}"/>
+      <thm15:themeFamily xmlns:thm15="http://schemas.microsoft.com/office/thememl/2012/main" name="Office Theme" id="{62F939B6-93AF-4DB8-9C6B-D6C7DFDC589F}" vid="{4A3C46E8-61CC-4603-A589-7422A47A8E4A}"/>
     </a:ext>
   </a:extLst>
 </a:theme>

</xml_diff>